<commit_message>
AR: update of presentation
</commit_message>
<xml_diff>
--- a/FinalPresentation.pptx
+++ b/FinalPresentation.pptx
@@ -25379,7 +25379,7 @@
       </p:pic>
       <p:pic>
         <p:nvPicPr>
-          <p:cNvPr id="7" name="Picture 6" descr="A screenshot of a cell phone&#10;&#10;Description automatically generated">
+          <p:cNvPr id="7" name="Picture 6">
             <a:extLst>
               <a:ext uri="{FF2B5EF4-FFF2-40B4-BE49-F238E27FC236}">
                 <a16:creationId xmlns:a16="http://schemas.microsoft.com/office/drawing/2014/main" id="{396E7871-30B1-4364-A8D2-87A4B88A5F84}"/>
@@ -25399,14 +25399,13 @@
               </a:ext>
             </a:extLst>
           </a:blip>
-          <a:stretch>
-            <a:fillRect/>
-          </a:stretch>
+          <a:srcRect/>
+          <a:stretch/>
         </p:blipFill>
         <p:spPr>
           <a:xfrm>
-            <a:off x="6338317" y="657073"/>
-            <a:ext cx="5213603" cy="3115127"/>
+            <a:off x="6338317" y="671279"/>
+            <a:ext cx="5213603" cy="3086714"/>
           </a:xfrm>
           <a:prstGeom prst="rect">
             <a:avLst/>
@@ -25849,7 +25848,7 @@
           <a:p>
             <a:r>
               <a:rPr lang="en-US" dirty="0"/>
-              <a:t>Every good for scaling</a:t>
+              <a:t>Very good for scaling</a:t>
             </a:r>
           </a:p>
           <a:p>
@@ -25888,13 +25887,8 @@
           <a:p>
             <a:r>
               <a:rPr lang="en-US" dirty="0"/>
-              <a:t>Can easily see how networking and threading can </a:t>
+              <a:t>Can easily see how networking and threading can be utilized</a:t>
             </a:r>
-            <a:r>
-              <a:rPr lang="en-US"/>
-              <a:t>be utilized</a:t>
-            </a:r>
-            <a:endParaRPr lang="en-US" dirty="0"/>
           </a:p>
           <a:p>
             <a:r>

</xml_diff>